<commit_message>
Updated slides front page
</commit_message>
<xml_diff>
--- a/files/DHX_infopaev_2017.04.06.pptx
+++ b/files/DHX_infopaev_2017.04.06.pptx
@@ -236,7 +236,7 @@
   </p:defaultTextStyle>
   <p:extLst>
     <p:ext uri="{EFAFB233-063F-42B5-8137-9DF3F51BA10A}">
-      <p15:sldGuideLst xmlns:p15="http://schemas.microsoft.com/office/powerpoint/2012/main" xmlns="">
+      <p15:sldGuideLst xmlns="" xmlns:p15="http://schemas.microsoft.com/office/powerpoint/2012/main">
         <p15:guide id="1" orient="horz" pos="2160">
           <p15:clr>
             <a:srgbClr val="A4A3A4"/>
@@ -250,7 +250,7 @@
       </p15:sldGuideLst>
     </p:ext>
     <p:ext uri="{2D200454-40CA-4A62-9FC3-DE9A4176ACB9}">
-      <p15:notesGuideLst xmlns:p15="http://schemas.microsoft.com/office/powerpoint/2012/main" xmlns="">
+      <p15:notesGuideLst xmlns="" xmlns:p15="http://schemas.microsoft.com/office/powerpoint/2012/main">
         <p15:guide id="1" orient="horz" pos="2880">
           <p15:clr>
             <a:srgbClr val="A4A3A4"/>
@@ -355,7 +355,7 @@
           <a:p>
             <a:fld id="{29D8DE50-250F-4C97-99C7-4DF4C62BCC47}" type="datetimeFigureOut">
               <a:rPr lang="et-EE" smtClean="0"/>
-              <a:t>6.04.2017</a:t>
+              <a:t>2.05.2017</a:t>
             </a:fld>
             <a:endParaRPr lang="et-EE"/>
           </a:p>
@@ -2306,7 +2306,7 @@
                 </a:solidFill>
               </a:rPr>
               <a:pPr/>
-              <a:t>6.04.2017</a:t>
+              <a:t>2.05.2017</a:t>
             </a:fld>
             <a:endParaRPr lang="et-EE">
               <a:solidFill>
@@ -2457,7 +2457,7 @@
                 </a:solidFill>
               </a:rPr>
               <a:pPr/>
-              <a:t>6.04.2017</a:t>
+              <a:t>2.05.2017</a:t>
             </a:fld>
             <a:endParaRPr lang="et-EE">
               <a:solidFill>
@@ -2580,7 +2580,7 @@
                 </a:solidFill>
               </a:rPr>
               <a:pPr/>
-              <a:t>6.04.2017</a:t>
+              <a:t>2.05.2017</a:t>
             </a:fld>
             <a:endParaRPr lang="et-EE">
               <a:solidFill>
@@ -2863,7 +2863,7 @@
                 </a:solidFill>
               </a:rPr>
               <a:pPr/>
-              <a:t>6.04.2017</a:t>
+              <a:t>2.05.2017</a:t>
             </a:fld>
             <a:endParaRPr lang="et-EE">
               <a:solidFill>
@@ -3154,7 +3154,7 @@
                 </a:solidFill>
               </a:rPr>
               <a:pPr/>
-              <a:t>6.04.2017</a:t>
+              <a:t>2.05.2017</a:t>
             </a:fld>
             <a:endParaRPr lang="et-EE">
               <a:solidFill>
@@ -3433,7 +3433,7 @@
                 </a:solidFill>
               </a:rPr>
               <a:pPr/>
-              <a:t>6.04.2017</a:t>
+              <a:t>2.05.2017</a:t>
             </a:fld>
             <a:endParaRPr lang="et-EE">
               <a:solidFill>
@@ -3775,7 +3775,7 @@
                 </a:solidFill>
               </a:rPr>
               <a:pPr/>
-              <a:t>6.04.2017</a:t>
+              <a:t>2.05.2017</a:t>
             </a:fld>
             <a:endParaRPr lang="et-EE">
               <a:solidFill>
@@ -4174,7 +4174,7 @@
                 </a:solidFill>
               </a:rPr>
               <a:pPr/>
-              <a:t>6.04.2017</a:t>
+              <a:t>2.05.2017</a:t>
             </a:fld>
             <a:endParaRPr lang="et-EE">
               <a:solidFill>
@@ -4516,7 +4516,7 @@
                 </a:solidFill>
               </a:rPr>
               <a:pPr/>
-              <a:t>6.04.2017</a:t>
+              <a:t>2.05.2017</a:t>
             </a:fld>
             <a:endParaRPr lang="et-EE">
               <a:solidFill>
@@ -4965,7 +4965,7 @@
                 </a:solidFill>
               </a:rPr>
               <a:pPr/>
-              <a:t>6.04.2017</a:t>
+              <a:t>2.05.2017</a:t>
             </a:fld>
             <a:endParaRPr lang="et-EE">
               <a:solidFill>
@@ -5340,7 +5340,7 @@
                 </a:solidFill>
               </a:rPr>
               <a:pPr/>
-              <a:t>6.04.2017</a:t>
+              <a:t>2.05.2017</a:t>
             </a:fld>
             <a:endParaRPr lang="et-EE">
               <a:solidFill>
@@ -5548,7 +5548,7 @@
                 </a:solidFill>
               </a:rPr>
               <a:pPr/>
-              <a:t>6.04.2017</a:t>
+              <a:t>2.05.2017</a:t>
             </a:fld>
             <a:endParaRPr lang="et-EE">
               <a:solidFill>
@@ -6747,7 +6747,7 @@
                 </a:solidFill>
               </a:rPr>
               <a:pPr/>
-              <a:t>6.04.2017</a:t>
+              <a:t>2.05.2017</a:t>
             </a:fld>
             <a:endParaRPr lang="et-EE">
               <a:solidFill>
@@ -6951,7 +6951,7 @@
                 </a:solidFill>
               </a:rPr>
               <a:pPr/>
-              <a:t>6.04.2017</a:t>
+              <a:t>2.05.2017</a:t>
             </a:fld>
             <a:endParaRPr lang="et-EE">
               <a:solidFill>
@@ -7226,7 +7226,7 @@
                 </a:solidFill>
               </a:rPr>
               <a:pPr/>
-              <a:t>6.04.2017</a:t>
+              <a:t>2.05.2017</a:t>
             </a:fld>
             <a:endParaRPr lang="et-EE">
               <a:solidFill>
@@ -7486,7 +7486,7 @@
                 </a:solidFill>
               </a:rPr>
               <a:pPr/>
-              <a:t>6.04.2017</a:t>
+              <a:t>2.05.2017</a:t>
             </a:fld>
             <a:endParaRPr lang="et-EE">
               <a:solidFill>
@@ -9278,7 +9278,7 @@
                 <a:buFontTx/>
                 <a:buNone/>
               </a:pPr>
-              <a:t>6.04.2017</a:t>
+              <a:t>2.05.2017</a:t>
             </a:fld>
             <a:endParaRPr lang="et-EE">
               <a:solidFill>
@@ -9968,14 +9968,14 @@
       </p:sp>
       <p:pic>
         <p:nvPicPr>
-          <p:cNvPr id="4" name="Picture 2" descr="C:\Users\hannesk\AppData\Local\Microsoft\Windows\Temporary Internet Files\Content.Outlook\QI6XP1UE\EL_Sotsiaalfond_horisontaalne.jpg"/>
+          <p:cNvPr id="1026" name="Picture 2" descr="Euroopa Regionaalarengu Fond"/>
           <p:cNvPicPr>
             <a:picLocks noChangeAspect="1" noChangeArrowheads="1"/>
           </p:cNvPicPr>
           <p:nvPr/>
         </p:nvPicPr>
         <p:blipFill>
-          <a:blip r:embed="rId3" cstate="print">
+          <a:blip r:embed="rId3">
             <a:extLst>
               <a:ext uri="{28A0092B-C50C-407E-A947-70E740481C1C}">
                 <a14:useLocalDpi xmlns:a14="http://schemas.microsoft.com/office/drawing/2010/main" val="0"/>
@@ -9989,8 +9989,8 @@
         </p:blipFill>
         <p:spPr bwMode="auto">
           <a:xfrm>
-            <a:off x="6462210" y="233645"/>
-            <a:ext cx="2456765" cy="1297704"/>
+            <a:off x="6597225" y="233645"/>
+            <a:ext cx="2321750" cy="1345942"/>
           </a:xfrm>
           <a:prstGeom prst="rect">
             <a:avLst/>
@@ -11588,13 +11588,7 @@
               <a:rPr lang="et-EE" dirty="0" smtClean="0">
                 <a:latin typeface="Arial Narrow" panose="020B0606020202030204" pitchFamily="34" charset="0"/>
               </a:rPr>
-              <a:t>Kirja </a:t>
-            </a:r>
-            <a:r>
-              <a:rPr lang="et-EE" dirty="0" smtClean="0">
-                <a:latin typeface="Arial Narrow" panose="020B0606020202030204" pitchFamily="34" charset="0"/>
-              </a:rPr>
-              <a:t>kohalejõudmist</a:t>
+              <a:t>Kirja kohalejõudmist</a:t>
             </a:r>
           </a:p>
           <a:p>
@@ -12050,13 +12044,7 @@
               <a:rPr lang="et-EE" dirty="0" smtClean="0">
                 <a:latin typeface="Arial Narrow" panose="020B0606020202030204" pitchFamily="34" charset="0"/>
               </a:rPr>
-              <a:t>Kirjavahetuse </a:t>
-            </a:r>
-            <a:r>
-              <a:rPr lang="et-EE" dirty="0" smtClean="0">
-                <a:latin typeface="Arial Narrow" panose="020B0606020202030204" pitchFamily="34" charset="0"/>
-              </a:rPr>
-              <a:t>saladust</a:t>
+              <a:t>Kirjavahetuse saladust</a:t>
             </a:r>
           </a:p>
           <a:p>
@@ -12280,13 +12268,7 @@
               <a:rPr lang="et-EE" dirty="0" smtClean="0">
                 <a:latin typeface="Arial Narrow" panose="020B0606020202030204" pitchFamily="34" charset="0"/>
               </a:rPr>
-              <a:t>Ma </a:t>
-            </a:r>
-            <a:r>
-              <a:rPr lang="et-EE" dirty="0" smtClean="0">
-                <a:latin typeface="Arial Narrow" panose="020B0606020202030204" pitchFamily="34" charset="0"/>
-              </a:rPr>
-              <a:t>ei taha ise postkontoris paki järel käia</a:t>
+              <a:t>Ma ei taha ise postkontoris paki järel käia</a:t>
             </a:r>
           </a:p>
           <a:p>
@@ -12456,13 +12438,7 @@
               <a:rPr lang="et-EE" dirty="0" smtClean="0">
                 <a:latin typeface="Arial Narrow" panose="020B0606020202030204" pitchFamily="34" charset="0"/>
               </a:rPr>
-              <a:t>REQ1 </a:t>
-            </a:r>
-            <a:r>
-              <a:rPr lang="et-EE" dirty="0" smtClean="0">
-                <a:latin typeface="Arial Narrow" panose="020B0606020202030204" pitchFamily="34" charset="0"/>
-              </a:rPr>
-              <a:t>Sõnumi terviklus </a:t>
+              <a:t>REQ1 Sõnumi terviklus </a:t>
             </a:r>
             <a:r>
               <a:rPr lang="et-EE" i="1" dirty="0" smtClean="0">
@@ -12709,21 +12685,7 @@
                 <a:ea typeface="Roboto Slab" pitchFamily="2" charset="0"/>
                 <a:cs typeface="Times New Roman" panose="02020603050405020304" pitchFamily="18" charset="0"/>
               </a:rPr>
-              <a:t>See võib </a:t>
-            </a:r>
-            <a:r>
-              <a:rPr lang="et-EE" sz="3600" dirty="0" smtClean="0">
-                <a:solidFill>
-                  <a:schemeClr val="tx1">
-                    <a:lumMod val="75000"/>
-                    <a:lumOff val="25000"/>
-                  </a:schemeClr>
-                </a:solidFill>
-                <a:latin typeface="Arial Narrow" panose="020B0606020202030204" pitchFamily="34" charset="0"/>
-                <a:ea typeface="Roboto Slab" pitchFamily="2" charset="0"/>
-                <a:cs typeface="Times New Roman" panose="02020603050405020304" pitchFamily="18" charset="0"/>
-              </a:rPr>
-              <a:t>tunduda </a:t>
+              <a:t>See võib tunduda </a:t>
             </a:r>
             <a:r>
               <a:rPr lang="et-EE" sz="3600" dirty="0" smtClean="0">
@@ -12936,13 +12898,7 @@
               <a:rPr lang="et-EE" sz="2800" i="1" dirty="0" smtClean="0">
                 <a:latin typeface="Arial Narrow" panose="020B0606020202030204" pitchFamily="34" charset="0"/>
               </a:rPr>
-              <a:t>saatjal </a:t>
-            </a:r>
-            <a:r>
-              <a:rPr lang="et-EE" sz="2800" i="1" dirty="0" smtClean="0">
-                <a:latin typeface="Arial Narrow" panose="020B0606020202030204" pitchFamily="34" charset="0"/>
-              </a:rPr>
-              <a:t>piisab adressaadi registrikoodi teadmisest, et kiri teele panna.</a:t>
+              <a:t>saatjal piisab adressaadi registrikoodi teadmisest, et kiri teele panna.</a:t>
             </a:r>
           </a:p>
           <a:p>
@@ -13279,13 +13235,7 @@
               <a:rPr lang="et-EE" dirty="0" smtClean="0">
                 <a:latin typeface="Arial Narrow" panose="020B0606020202030204" pitchFamily="34" charset="0"/>
               </a:rPr>
-              <a:t>lihtsa </a:t>
-            </a:r>
-            <a:r>
-              <a:rPr lang="et-EE" dirty="0" smtClean="0">
-                <a:latin typeface="Arial Narrow" panose="020B0606020202030204" pitchFamily="34" charset="0"/>
-              </a:rPr>
-              <a:t>teostatavuse – </a:t>
+              <a:t>lihtsa teostatavuse – </a:t>
             </a:r>
             <a:r>
               <a:rPr lang="et-EE" sz="2800" i="1" dirty="0" smtClean="0">
@@ -13471,13 +13421,7 @@
               <a:rPr lang="et-EE" dirty="0" smtClean="0">
                 <a:latin typeface="Arial Narrow" panose="020B0606020202030204" pitchFamily="34" charset="0"/>
               </a:rPr>
-              <a:t> </a:t>
-            </a:r>
-            <a:r>
-              <a:rPr lang="et-EE" dirty="0" smtClean="0">
-                <a:latin typeface="Arial Narrow" panose="020B0606020202030204" pitchFamily="34" charset="0"/>
-              </a:rPr>
-              <a:t>dokumenditüübi suhtes – </a:t>
+              <a:t> dokumenditüübi suhtes – </a:t>
             </a:r>
             <a:r>
               <a:rPr lang="et-EE" sz="2800" i="1" dirty="0">
@@ -14033,6 +13977,13 @@
   <p:clrMapOvr>
     <a:masterClrMapping/>
   </p:clrMapOvr>
+  <p:timing>
+    <p:tnLst>
+      <p:par>
+        <p:cTn id="1" dur="indefinite" restart="never" nodeType="tmRoot"/>
+      </p:par>
+    </p:tnLst>
+  </p:timing>
 </p:sld>
 </file>
 
@@ -20168,11 +20119,7 @@
             </a:r>
             <a:r>
               <a:rPr lang="en-GB" dirty="0" smtClean="0"/>
-              <a:t> </a:t>
-            </a:r>
-            <a:r>
-              <a:rPr lang="en-GB" dirty="0" smtClean="0"/>
-              <a:t>DHS-dele</a:t>
+              <a:t> DHS-dele</a:t>
             </a:r>
             <a:endParaRPr lang="et-EE" dirty="0"/>
           </a:p>
@@ -21654,11 +21601,7 @@
           <a:p>
             <a:r>
               <a:rPr lang="et-EE" dirty="0" smtClean="0"/>
-              <a:t>DHX pole </a:t>
-            </a:r>
-            <a:r>
-              <a:rPr lang="et-EE" dirty="0" smtClean="0"/>
-              <a:t>veel valmis</a:t>
+              <a:t>DHX pole veel valmis</a:t>
             </a:r>
             <a:endParaRPr lang="et-EE" dirty="0"/>
           </a:p>
@@ -23376,7 +23319,7 @@
   </a:extraClrSchemeLst>
   <a:extLst>
     <a:ext uri="{05A4C25C-085E-4340-85A3-A5531E510DB2}">
-      <thm15:themeFamily xmlns:thm15="http://schemas.microsoft.com/office/thememl/2012/main" xmlns="" name="Office Theme" id="{62F939B6-93AF-4DB8-9C6B-D6C7DFDC589F}" vid="{4A3C46E8-61CC-4603-A589-7422A47A8E4A}"/>
+      <thm15:themeFamily xmlns="" xmlns:thm15="http://schemas.microsoft.com/office/thememl/2012/main" name="Office Theme" id="{62F939B6-93AF-4DB8-9C6B-D6C7DFDC589F}" vid="{4A3C46E8-61CC-4603-A589-7422A47A8E4A}"/>
     </a:ext>
   </a:extLst>
 </a:theme>
@@ -23633,7 +23576,7 @@
   <a:extraClrSchemeLst/>
   <a:extLst>
     <a:ext uri="{05A4C25C-085E-4340-85A3-A5531E510DB2}">
-      <thm15:themeFamily xmlns="" xmlns:thm15="http://schemas.microsoft.com/office/thememl/2012/main" name="Facet" id="{C0C680CD-088A-49FC-A102-D699147F32B2}" vid="{CFBC31BA-B70F-4F30-BCAA-4F3011E16C4D}"/>
+      <thm15:themeFamily xmlns:thm15="http://schemas.microsoft.com/office/thememl/2012/main" xmlns="" name="Facet" id="{C0C680CD-088A-49FC-A102-D699147F32B2}" vid="{CFBC31BA-B70F-4F30-BCAA-4F3011E16C4D}"/>
     </a:ext>
   </a:extLst>
 </a:theme>
@@ -23894,7 +23837,7 @@
   <a:extraClrSchemeLst/>
   <a:extLst>
     <a:ext uri="{05A4C25C-085E-4340-85A3-A5531E510DB2}">
-      <thm15:themeFamily xmlns:thm15="http://schemas.microsoft.com/office/thememl/2012/main" xmlns="" name="Office Theme" id="{62F939B6-93AF-4DB8-9C6B-D6C7DFDC589F}" vid="{4A3C46E8-61CC-4603-A589-7422A47A8E4A}"/>
+      <thm15:themeFamily xmlns="" xmlns:thm15="http://schemas.microsoft.com/office/thememl/2012/main" name="Office Theme" id="{62F939B6-93AF-4DB8-9C6B-D6C7DFDC589F}" vid="{4A3C46E8-61CC-4603-A589-7422A47A8E4A}"/>
     </a:ext>
   </a:extLst>
 </a:theme>

</xml_diff>